<commit_message>
Several updates to Razor Pages chapter
Many exercise solutions updated, also a few materials. Added a Razor Pages Overview presentation.
</commit_message>
<xml_diff>
--- a/Chap/RazorPages/RazorPagesogData.pptx
+++ b/Chap/RazorPages/RazorPagesogData.pptx
@@ -286,7 +286,7 @@
           <a:p>
             <a:fld id="{2DCD39D1-44BD-4CDD-A706-5F5DCAF7D52E}" type="datetimeFigureOut">
               <a:rPr lang="da-DK" smtClean="0"/>
-              <a:t>08-11-2022</a:t>
+              <a:t>07-11-2023</a:t>
             </a:fld>
             <a:endParaRPr lang="da-DK"/>
           </a:p>
@@ -484,7 +484,7 @@
           <a:p>
             <a:fld id="{2DCD39D1-44BD-4CDD-A706-5F5DCAF7D52E}" type="datetimeFigureOut">
               <a:rPr lang="da-DK" smtClean="0"/>
-              <a:t>08-11-2022</a:t>
+              <a:t>07-11-2023</a:t>
             </a:fld>
             <a:endParaRPr lang="da-DK"/>
           </a:p>
@@ -692,7 +692,7 @@
           <a:p>
             <a:fld id="{2DCD39D1-44BD-4CDD-A706-5F5DCAF7D52E}" type="datetimeFigureOut">
               <a:rPr lang="da-DK" smtClean="0"/>
-              <a:t>08-11-2022</a:t>
+              <a:t>07-11-2023</a:t>
             </a:fld>
             <a:endParaRPr lang="da-DK"/>
           </a:p>
@@ -890,7 +890,7 @@
           <a:p>
             <a:fld id="{2DCD39D1-44BD-4CDD-A706-5F5DCAF7D52E}" type="datetimeFigureOut">
               <a:rPr lang="da-DK" smtClean="0"/>
-              <a:t>08-11-2022</a:t>
+              <a:t>07-11-2023</a:t>
             </a:fld>
             <a:endParaRPr lang="da-DK"/>
           </a:p>
@@ -1165,7 +1165,7 @@
           <a:p>
             <a:fld id="{2DCD39D1-44BD-4CDD-A706-5F5DCAF7D52E}" type="datetimeFigureOut">
               <a:rPr lang="da-DK" smtClean="0"/>
-              <a:t>08-11-2022</a:t>
+              <a:t>07-11-2023</a:t>
             </a:fld>
             <a:endParaRPr lang="da-DK"/>
           </a:p>
@@ -1430,7 +1430,7 @@
           <a:p>
             <a:fld id="{2DCD39D1-44BD-4CDD-A706-5F5DCAF7D52E}" type="datetimeFigureOut">
               <a:rPr lang="da-DK" smtClean="0"/>
-              <a:t>08-11-2022</a:t>
+              <a:t>07-11-2023</a:t>
             </a:fld>
             <a:endParaRPr lang="da-DK"/>
           </a:p>
@@ -1842,7 +1842,7 @@
           <a:p>
             <a:fld id="{2DCD39D1-44BD-4CDD-A706-5F5DCAF7D52E}" type="datetimeFigureOut">
               <a:rPr lang="da-DK" smtClean="0"/>
-              <a:t>08-11-2022</a:t>
+              <a:t>07-11-2023</a:t>
             </a:fld>
             <a:endParaRPr lang="da-DK"/>
           </a:p>
@@ -1983,7 +1983,7 @@
           <a:p>
             <a:fld id="{2DCD39D1-44BD-4CDD-A706-5F5DCAF7D52E}" type="datetimeFigureOut">
               <a:rPr lang="da-DK" smtClean="0"/>
-              <a:t>08-11-2022</a:t>
+              <a:t>07-11-2023</a:t>
             </a:fld>
             <a:endParaRPr lang="da-DK"/>
           </a:p>
@@ -2096,7 +2096,7 @@
           <a:p>
             <a:fld id="{2DCD39D1-44BD-4CDD-A706-5F5DCAF7D52E}" type="datetimeFigureOut">
               <a:rPr lang="da-DK" smtClean="0"/>
-              <a:t>08-11-2022</a:t>
+              <a:t>07-11-2023</a:t>
             </a:fld>
             <a:endParaRPr lang="da-DK"/>
           </a:p>
@@ -2407,7 +2407,7 @@
           <a:p>
             <a:fld id="{2DCD39D1-44BD-4CDD-A706-5F5DCAF7D52E}" type="datetimeFigureOut">
               <a:rPr lang="da-DK" smtClean="0"/>
-              <a:t>08-11-2022</a:t>
+              <a:t>07-11-2023</a:t>
             </a:fld>
             <a:endParaRPr lang="da-DK"/>
           </a:p>
@@ -2695,7 +2695,7 @@
           <a:p>
             <a:fld id="{2DCD39D1-44BD-4CDD-A706-5F5DCAF7D52E}" type="datetimeFigureOut">
               <a:rPr lang="da-DK" smtClean="0"/>
-              <a:t>08-11-2022</a:t>
+              <a:t>07-11-2023</a:t>
             </a:fld>
             <a:endParaRPr lang="da-DK"/>
           </a:p>
@@ -2936,7 +2936,7 @@
           <a:p>
             <a:fld id="{2DCD39D1-44BD-4CDD-A706-5F5DCAF7D52E}" type="datetimeFigureOut">
               <a:rPr lang="da-DK" smtClean="0"/>
-              <a:t>08-11-2022</a:t>
+              <a:t>07-11-2023</a:t>
             </a:fld>
             <a:endParaRPr lang="da-DK"/>
           </a:p>
@@ -5389,7 +5389,7 @@
           <a:p>
             <a:r>
               <a:rPr lang="da-DK" dirty="0"/>
-              <a:t>View-delen skal kunne vise et enkelt domæne-objekt, og alle ikke-beregnede propertie skal kunne rettes.</a:t>
+              <a:t>View-delen skal kunne vise et enkelt domæne-objekt, og alle ikke-beregnede properties skal kunne rettes.</a:t>
             </a:r>
           </a:p>
           <a:p>

</xml_diff>